<commit_message>
Updated GPU DSVM slides
</commit_message>
<xml_diff>
--- a/Deep Learning and the Microsoft Cognitive Toolkit/CNTK Hands-on in GPU DSVMs/AI_Immersion_CNTK_Hands_on_GPU_DSVM.pptx
+++ b/Deep Learning and the Microsoft Cognitive Toolkit/CNTK Hands-on in GPU DSVMs/AI_Immersion_CNTK_Hands_on_GPU_DSVM.pptx
@@ -5,10 +5,10 @@
     <p:sldMasterId id="2147484229" r:id="rId4"/>
   </p:sldMasterIdLst>
   <p:notesMasterIdLst>
-    <p:notesMasterId r:id="rId20"/>
+    <p:notesMasterId r:id="rId21"/>
   </p:notesMasterIdLst>
   <p:handoutMasterIdLst>
-    <p:handoutMasterId r:id="rId21"/>
+    <p:handoutMasterId r:id="rId22"/>
   </p:handoutMasterIdLst>
   <p:sldIdLst>
     <p:sldId id="1485" r:id="rId5"/>
@@ -25,7 +25,8 @@
     <p:sldId id="1565" r:id="rId16"/>
     <p:sldId id="1562" r:id="rId17"/>
     <p:sldId id="1563" r:id="rId18"/>
-    <p:sldId id="1532" r:id="rId19"/>
+    <p:sldId id="1566" r:id="rId19"/>
+    <p:sldId id="1532" r:id="rId20"/>
   </p:sldIdLst>
   <p:sldSz cx="12436475" cy="6994525"/>
   <p:notesSz cx="6858000" cy="9144000"/>
@@ -143,6 +144,7 @@
             <p14:sldId id="1565"/>
             <p14:sldId id="1562"/>
             <p14:sldId id="1563"/>
+            <p14:sldId id="1566"/>
             <p14:sldId id="1532"/>
           </p14:sldIdLst>
         </p14:section>
@@ -190,8 +192,325 @@
 </p:cmAuthorLst>
 </file>
 
-<file path=ppt/revisionInfo.xml><?xml version="1.0" encoding="utf-8"?>
-<p1510:revInfo xmlns:a="http://schemas.openxmlformats.org/drawingml/2006/main" xmlns:r="http://schemas.openxmlformats.org/officeDocument/2006/relationships" xmlns:p1510="http://schemas.microsoft.com/office/powerpoint/2015/10/main"/>
+<file path=ppt/changesInfos/changesInfo1.xml><?xml version="1.0" encoding="utf-8"?>
+<pc:chgInfo xmlns:a="http://schemas.openxmlformats.org/drawingml/2006/main" xmlns:r="http://schemas.openxmlformats.org/officeDocument/2006/relationships" xmlns:ac="http://schemas.microsoft.com/office/drawing/2013/main/command" xmlns:pc="http://schemas.microsoft.com/office/powerpoint/2013/main/command">
+  <pc:docChgLst>
+    <pc:chgData name="Paul Shealy" userId="ce785693-0585-4637-af68-c5060776d0ae" providerId="ADAL" clId="{581F6FC1-552D-4510-838D-118695E26488}"/>
+    <pc:docChg chg="undo custSel addSld delSld modSld modSection">
+      <pc:chgData name="Paul Shealy" userId="ce785693-0585-4637-af68-c5060776d0ae" providerId="ADAL" clId="{581F6FC1-552D-4510-838D-118695E26488}" dt="2017-05-08T19:09:24.522" v="345" actId="14100"/>
+      <pc:docMkLst>
+        <pc:docMk/>
+      </pc:docMkLst>
+      <pc:sldChg chg="del">
+        <pc:chgData name="Paul Shealy" userId="ce785693-0585-4637-af68-c5060776d0ae" providerId="ADAL" clId="{581F6FC1-552D-4510-838D-118695E26488}" dt="2017-05-07T20:41:25.390" v="220" actId="2696"/>
+        <pc:sldMkLst>
+          <pc:docMk/>
+          <pc:sldMk cId="1952752632" sldId="1522"/>
+        </pc:sldMkLst>
+      </pc:sldChg>
+      <pc:sldChg chg="del">
+        <pc:chgData name="Paul Shealy" userId="ce785693-0585-4637-af68-c5060776d0ae" providerId="ADAL" clId="{581F6FC1-552D-4510-838D-118695E26488}" dt="2017-05-07T20:41:25.943" v="221" actId="2696"/>
+        <pc:sldMkLst>
+          <pc:docMk/>
+          <pc:sldMk cId="1995050349" sldId="1523"/>
+        </pc:sldMkLst>
+      </pc:sldChg>
+      <pc:sldChg chg="del">
+        <pc:chgData name="Paul Shealy" userId="ce785693-0585-4637-af68-c5060776d0ae" providerId="ADAL" clId="{581F6FC1-552D-4510-838D-118695E26488}" dt="2017-05-07T20:41:26.481" v="222" actId="2696"/>
+        <pc:sldMkLst>
+          <pc:docMk/>
+          <pc:sldMk cId="1811665972" sldId="1524"/>
+        </pc:sldMkLst>
+      </pc:sldChg>
+      <pc:sldChg chg="del">
+        <pc:chgData name="Paul Shealy" userId="ce785693-0585-4637-af68-c5060776d0ae" providerId="ADAL" clId="{581F6FC1-552D-4510-838D-118695E26488}" dt="2017-05-07T20:41:28.247" v="224" actId="2696"/>
+        <pc:sldMkLst>
+          <pc:docMk/>
+          <pc:sldMk cId="3874882342" sldId="1525"/>
+        </pc:sldMkLst>
+      </pc:sldChg>
+      <pc:sldChg chg="add del">
+        <pc:chgData name="Paul Shealy" userId="ce785693-0585-4637-af68-c5060776d0ae" providerId="ADAL" clId="{581F6FC1-552D-4510-838D-118695E26488}" dt="2017-05-07T20:41:55.432" v="245" actId="2696"/>
+        <pc:sldMkLst>
+          <pc:docMk/>
+          <pc:sldMk cId="203203085" sldId="1527"/>
+        </pc:sldMkLst>
+      </pc:sldChg>
+      <pc:sldChg chg="del">
+        <pc:chgData name="Paul Shealy" userId="ce785693-0585-4637-af68-c5060776d0ae" providerId="ADAL" clId="{581F6FC1-552D-4510-838D-118695E26488}" dt="2017-05-07T20:41:56.117" v="246" actId="2696"/>
+        <pc:sldMkLst>
+          <pc:docMk/>
+          <pc:sldMk cId="242452099" sldId="1528"/>
+        </pc:sldMkLst>
+      </pc:sldChg>
+      <pc:sldChg chg="del">
+        <pc:chgData name="Paul Shealy" userId="ce785693-0585-4637-af68-c5060776d0ae" providerId="ADAL" clId="{581F6FC1-552D-4510-838D-118695E26488}" dt="2017-05-07T20:41:58.482" v="248" actId="2696"/>
+        <pc:sldMkLst>
+          <pc:docMk/>
+          <pc:sldMk cId="3249496989" sldId="1529"/>
+        </pc:sldMkLst>
+      </pc:sldChg>
+      <pc:sldChg chg="del">
+        <pc:chgData name="Paul Shealy" userId="ce785693-0585-4637-af68-c5060776d0ae" providerId="ADAL" clId="{581F6FC1-552D-4510-838D-118695E26488}" dt="2017-05-07T20:42:00.774" v="250" actId="2696"/>
+        <pc:sldMkLst>
+          <pc:docMk/>
+          <pc:sldMk cId="1041029672" sldId="1530"/>
+        </pc:sldMkLst>
+      </pc:sldChg>
+      <pc:sldChg chg="del">
+        <pc:chgData name="Paul Shealy" userId="ce785693-0585-4637-af68-c5060776d0ae" providerId="ADAL" clId="{581F6FC1-552D-4510-838D-118695E26488}" dt="2017-05-07T20:42:03.123" v="251" actId="2696"/>
+        <pc:sldMkLst>
+          <pc:docMk/>
+          <pc:sldMk cId="1789865309" sldId="1531"/>
+        </pc:sldMkLst>
+      </pc:sldChg>
+      <pc:sldChg chg="add del">
+        <pc:chgData name="Paul Shealy" userId="ce785693-0585-4637-af68-c5060776d0ae" providerId="ADAL" clId="{581F6FC1-552D-4510-838D-118695E26488}" dt="2017-05-07T20:42:05.318" v="253" actId="2696"/>
+        <pc:sldMkLst>
+          <pc:docMk/>
+          <pc:sldMk cId="2402828649" sldId="1532"/>
+        </pc:sldMkLst>
+      </pc:sldChg>
+      <pc:sldChg chg="del">
+        <pc:chgData name="Paul Shealy" userId="ce785693-0585-4637-af68-c5060776d0ae" providerId="ADAL" clId="{581F6FC1-552D-4510-838D-118695E26488}" dt="2017-05-07T20:41:24.897" v="219" actId="2696"/>
+        <pc:sldMkLst>
+          <pc:docMk/>
+          <pc:sldMk cId="895908902" sldId="1548"/>
+        </pc:sldMkLst>
+      </pc:sldChg>
+      <pc:sldChg chg="modSp">
+        <pc:chgData name="Paul Shealy" userId="ce785693-0585-4637-af68-c5060776d0ae" providerId="ADAL" clId="{581F6FC1-552D-4510-838D-118695E26488}" dt="2017-05-08T19:08:12.302" v="276" actId="20577"/>
+        <pc:sldMkLst>
+          <pc:docMk/>
+          <pc:sldMk cId="3632102777" sldId="1549"/>
+        </pc:sldMkLst>
+        <pc:spChg chg="mod">
+          <ac:chgData name="Paul Shealy" userId="ce785693-0585-4637-af68-c5060776d0ae" providerId="ADAL" clId="{581F6FC1-552D-4510-838D-118695E26488}" dt="2017-05-08T19:08:12.302" v="276" actId="20577"/>
+          <ac:spMkLst>
+            <pc:docMk/>
+            <pc:sldMk cId="3632102777" sldId="1549"/>
+            <ac:spMk id="3" creationId="{00000000-0000-0000-0000-000000000000}"/>
+          </ac:spMkLst>
+        </pc:spChg>
+      </pc:sldChg>
+      <pc:sldChg chg="del">
+        <pc:chgData name="Paul Shealy" userId="ce785693-0585-4637-af68-c5060776d0ae" providerId="ADAL" clId="{581F6FC1-552D-4510-838D-118695E26488}" dt="2017-05-07T20:41:27.496" v="223" actId="2696"/>
+        <pc:sldMkLst>
+          <pc:docMk/>
+          <pc:sldMk cId="1601114150" sldId="1550"/>
+        </pc:sldMkLst>
+      </pc:sldChg>
+      <pc:sldChg chg="del">
+        <pc:chgData name="Paul Shealy" userId="ce785693-0585-4637-af68-c5060776d0ae" providerId="ADAL" clId="{581F6FC1-552D-4510-838D-118695E26488}" dt="2017-05-07T20:41:59.088" v="249" actId="2696"/>
+        <pc:sldMkLst>
+          <pc:docMk/>
+          <pc:sldMk cId="1946518345" sldId="1551"/>
+        </pc:sldMkLst>
+      </pc:sldChg>
+      <pc:sldChg chg="del">
+        <pc:chgData name="Paul Shealy" userId="ce785693-0585-4637-af68-c5060776d0ae" providerId="ADAL" clId="{581F6FC1-552D-4510-838D-118695E26488}" dt="2017-05-07T20:41:57.393" v="247" actId="2696"/>
+        <pc:sldMkLst>
+          <pc:docMk/>
+          <pc:sldMk cId="2741989141" sldId="1552"/>
+        </pc:sldMkLst>
+      </pc:sldChg>
+      <pc:sldChg chg="addSp delSp modSp add modNotesTx">
+        <pc:chgData name="Paul Shealy" userId="ce785693-0585-4637-af68-c5060776d0ae" providerId="ADAL" clId="{581F6FC1-552D-4510-838D-118695E26488}" dt="2017-05-07T20:42:15.503" v="254" actId="6549"/>
+        <pc:sldMkLst>
+          <pc:docMk/>
+          <pc:sldMk cId="3960102039" sldId="1562"/>
+        </pc:sldMkLst>
+        <pc:spChg chg="del">
+          <ac:chgData name="Paul Shealy" userId="ce785693-0585-4637-af68-c5060776d0ae" providerId="ADAL" clId="{581F6FC1-552D-4510-838D-118695E26488}" dt="2017-05-04T00:41:50.561" v="7" actId="478"/>
+          <ac:spMkLst>
+            <pc:docMk/>
+            <pc:sldMk cId="3960102039" sldId="1562"/>
+            <ac:spMk id="5" creationId="{00000000-0000-0000-0000-000000000000}"/>
+          </ac:spMkLst>
+        </pc:spChg>
+        <pc:spChg chg="add mod">
+          <ac:chgData name="Paul Shealy" userId="ce785693-0585-4637-af68-c5060776d0ae" providerId="ADAL" clId="{581F6FC1-552D-4510-838D-118695E26488}" dt="2017-05-04T00:44:48.093" v="111" actId="20577"/>
+          <ac:spMkLst>
+            <pc:docMk/>
+            <pc:sldMk cId="3960102039" sldId="1562"/>
+            <ac:spMk id="6" creationId="{AADE3032-AAE8-4932-9BCD-3480FC178D0C}"/>
+          </ac:spMkLst>
+        </pc:spChg>
+        <pc:spChg chg="mod">
+          <ac:chgData name="Paul Shealy" userId="ce785693-0585-4637-af68-c5060776d0ae" providerId="ADAL" clId="{581F6FC1-552D-4510-838D-118695E26488}" dt="2017-05-04T00:41:44.693" v="6" actId="20577"/>
+          <ac:spMkLst>
+            <pc:docMk/>
+            <pc:sldMk cId="3960102039" sldId="1562"/>
+            <ac:spMk id="2" creationId="{00000000-0000-0000-0000-000000000000}"/>
+          </ac:spMkLst>
+        </pc:spChg>
+        <pc:picChg chg="add del mod">
+          <ac:chgData name="Paul Shealy" userId="ce785693-0585-4637-af68-c5060776d0ae" providerId="ADAL" clId="{581F6FC1-552D-4510-838D-118695E26488}" dt="2017-05-04T00:51:07.067" v="113" actId="478"/>
+          <ac:picMkLst>
+            <pc:docMk/>
+            <pc:sldMk cId="3960102039" sldId="1562"/>
+            <ac:picMk id="4" creationId="{1237D65E-9382-444C-9D5F-7FE0AF772ADC}"/>
+          </ac:picMkLst>
+        </pc:picChg>
+        <pc:picChg chg="del">
+          <ac:chgData name="Paul Shealy" userId="ce785693-0585-4637-af68-c5060776d0ae" providerId="ADAL" clId="{581F6FC1-552D-4510-838D-118695E26488}" dt="2017-05-04T00:41:51.758" v="8" actId="478"/>
+          <ac:picMkLst>
+            <pc:docMk/>
+            <pc:sldMk cId="3960102039" sldId="1562"/>
+            <ac:picMk id="3" creationId="{00000000-0000-0000-0000-000000000000}"/>
+          </ac:picMkLst>
+        </pc:picChg>
+        <pc:picChg chg="add mod">
+          <ac:chgData name="Paul Shealy" userId="ce785693-0585-4637-af68-c5060776d0ae" providerId="ADAL" clId="{581F6FC1-552D-4510-838D-118695E26488}" dt="2017-05-04T00:51:10.227" v="115" actId="1076"/>
+          <ac:picMkLst>
+            <pc:docMk/>
+            <pc:sldMk cId="3960102039" sldId="1562"/>
+            <ac:picMk id="7" creationId="{9B7D68A3-6BB7-41F0-801A-312F6EC0C906}"/>
+          </ac:picMkLst>
+        </pc:picChg>
+      </pc:sldChg>
+      <pc:sldChg chg="addSp delSp modSp add modNotesTx">
+        <pc:chgData name="Paul Shealy" userId="ce785693-0585-4637-af68-c5060776d0ae" providerId="ADAL" clId="{581F6FC1-552D-4510-838D-118695E26488}" dt="2017-05-04T00:52:09.186" v="176" actId="6549"/>
+        <pc:sldMkLst>
+          <pc:docMk/>
+          <pc:sldMk cId="1856631769" sldId="1563"/>
+        </pc:sldMkLst>
+        <pc:spChg chg="mod">
+          <ac:chgData name="Paul Shealy" userId="ce785693-0585-4637-af68-c5060776d0ae" providerId="ADAL" clId="{581F6FC1-552D-4510-838D-118695E26488}" dt="2017-05-04T00:52:00.911" v="173" actId="20577"/>
+          <ac:spMkLst>
+            <pc:docMk/>
+            <pc:sldMk cId="1856631769" sldId="1563"/>
+            <ac:spMk id="6" creationId="{AADE3032-AAE8-4932-9BCD-3480FC178D0C}"/>
+          </ac:spMkLst>
+        </pc:spChg>
+        <pc:spChg chg="mod">
+          <ac:chgData name="Paul Shealy" userId="ce785693-0585-4637-af68-c5060776d0ae" providerId="ADAL" clId="{581F6FC1-552D-4510-838D-118695E26488}" dt="2017-05-04T00:51:17.198" v="129" actId="20577"/>
+          <ac:spMkLst>
+            <pc:docMk/>
+            <pc:sldMk cId="1856631769" sldId="1563"/>
+            <ac:spMk id="2" creationId="{00000000-0000-0000-0000-000000000000}"/>
+          </ac:spMkLst>
+        </pc:spChg>
+        <pc:picChg chg="add mod">
+          <ac:chgData name="Paul Shealy" userId="ce785693-0585-4637-af68-c5060776d0ae" providerId="ADAL" clId="{581F6FC1-552D-4510-838D-118695E26488}" dt="2017-05-04T00:52:04.537" v="175" actId="1076"/>
+          <ac:picMkLst>
+            <pc:docMk/>
+            <pc:sldMk cId="1856631769" sldId="1563"/>
+            <ac:picMk id="1026" creationId="{288DA7E6-44D0-471A-8863-0ACD0A1D8CD1}"/>
+          </ac:picMkLst>
+        </pc:picChg>
+        <pc:picChg chg="del">
+          <ac:chgData name="Paul Shealy" userId="ce785693-0585-4637-af68-c5060776d0ae" providerId="ADAL" clId="{581F6FC1-552D-4510-838D-118695E26488}" dt="2017-05-04T00:51:30.575" v="130" actId="478"/>
+          <ac:picMkLst>
+            <pc:docMk/>
+            <pc:sldMk cId="1856631769" sldId="1563"/>
+            <ac:picMk id="7" creationId="{9B7D68A3-6BB7-41F0-801A-312F6EC0C906}"/>
+          </ac:picMkLst>
+        </pc:picChg>
+      </pc:sldChg>
+      <pc:sldChg chg="delSp modSp add del">
+        <pc:chgData name="Paul Shealy" userId="ce785693-0585-4637-af68-c5060776d0ae" providerId="ADAL" clId="{581F6FC1-552D-4510-838D-118695E26488}" dt="2017-05-07T20:41:34.436" v="228" actId="2696"/>
+        <pc:sldMkLst>
+          <pc:docMk/>
+          <pc:sldMk cId="3600315626" sldId="1564"/>
+        </pc:sldMkLst>
+        <pc:spChg chg="del">
+          <ac:chgData name="Paul Shealy" userId="ce785693-0585-4637-af68-c5060776d0ae" providerId="ADAL" clId="{581F6FC1-552D-4510-838D-118695E26488}" dt="2017-05-04T00:57:14.669" v="178" actId="478"/>
+          <ac:spMkLst>
+            <pc:docMk/>
+            <pc:sldMk cId="3600315626" sldId="1564"/>
+            <ac:spMk id="5" creationId="{00000000-0000-0000-0000-000000000000}"/>
+          </ac:spMkLst>
+        </pc:spChg>
+        <pc:spChg chg="mod">
+          <ac:chgData name="Paul Shealy" userId="ce785693-0585-4637-af68-c5060776d0ae" providerId="ADAL" clId="{581F6FC1-552D-4510-838D-118695E26488}" dt="2017-05-04T16:53:53.931" v="197" actId="20577"/>
+          <ac:spMkLst>
+            <pc:docMk/>
+            <pc:sldMk cId="3600315626" sldId="1564"/>
+            <ac:spMk id="2" creationId="{00000000-0000-0000-0000-000000000000}"/>
+          </ac:spMkLst>
+        </pc:spChg>
+        <pc:picChg chg="del">
+          <ac:chgData name="Paul Shealy" userId="ce785693-0585-4637-af68-c5060776d0ae" providerId="ADAL" clId="{581F6FC1-552D-4510-838D-118695E26488}" dt="2017-05-04T00:57:15.786" v="179" actId="478"/>
+          <ac:picMkLst>
+            <pc:docMk/>
+            <pc:sldMk cId="3600315626" sldId="1564"/>
+            <ac:picMk id="3" creationId="{00000000-0000-0000-0000-000000000000}"/>
+          </ac:picMkLst>
+        </pc:picChg>
+      </pc:sldChg>
+      <pc:sldChg chg="addSp delSp modSp add">
+        <pc:chgData name="Paul Shealy" userId="ce785693-0585-4637-af68-c5060776d0ae" providerId="ADAL" clId="{581F6FC1-552D-4510-838D-118695E26488}" dt="2017-05-08T19:09:24.522" v="345" actId="14100"/>
+        <pc:sldMkLst>
+          <pc:docMk/>
+          <pc:sldMk cId="426772791" sldId="1565"/>
+        </pc:sldMkLst>
+        <pc:spChg chg="del">
+          <ac:chgData name="Paul Shealy" userId="ce785693-0585-4637-af68-c5060776d0ae" providerId="ADAL" clId="{581F6FC1-552D-4510-838D-118695E26488}" dt="2017-05-07T20:41:38.531" v="229" actId="478"/>
+          <ac:spMkLst>
+            <pc:docMk/>
+            <pc:sldMk cId="426772791" sldId="1565"/>
+            <ac:spMk id="4" creationId="{00000000-0000-0000-0000-000000000000}"/>
+          </ac:spMkLst>
+        </pc:spChg>
+        <pc:spChg chg="add del mod">
+          <ac:chgData name="Paul Shealy" userId="ce785693-0585-4637-af68-c5060776d0ae" providerId="ADAL" clId="{581F6FC1-552D-4510-838D-118695E26488}" dt="2017-05-07T20:41:44.237" v="230" actId="478"/>
+          <ac:spMkLst>
+            <pc:docMk/>
+            <pc:sldMk cId="426772791" sldId="1565"/>
+            <ac:spMk id="5" creationId="{2DCCDC8B-12E9-4E65-863F-31463ED51823}"/>
+          </ac:spMkLst>
+        </pc:spChg>
+        <pc:spChg chg="mod">
+          <ac:chgData name="Paul Shealy" userId="ce785693-0585-4637-af68-c5060776d0ae" providerId="ADAL" clId="{581F6FC1-552D-4510-838D-118695E26488}" dt="2017-05-08T19:08:47.771" v="277" actId="1076"/>
+          <ac:spMkLst>
+            <pc:docMk/>
+            <pc:sldMk cId="426772791" sldId="1565"/>
+            <ac:spMk id="3" creationId="{00000000-0000-0000-0000-000000000000}"/>
+          </ac:spMkLst>
+        </pc:spChg>
+        <pc:spChg chg="add mod">
+          <ac:chgData name="Paul Shealy" userId="ce785693-0585-4637-af68-c5060776d0ae" providerId="ADAL" clId="{581F6FC1-552D-4510-838D-118695E26488}" dt="2017-05-08T19:09:24.522" v="345" actId="14100"/>
+          <ac:spMkLst>
+            <pc:docMk/>
+            <pc:sldMk cId="426772791" sldId="1565"/>
+            <ac:spMk id="6" creationId="{F2BE6246-9A1E-42BB-B6FA-B0AEFBF1379F}"/>
+          </ac:spMkLst>
+        </pc:spChg>
+      </pc:sldChg>
+      <pc:sldChg chg="addSp modSp add del">
+        <pc:chgData name="Paul Shealy" userId="ce785693-0585-4637-af68-c5060776d0ae" providerId="ADAL" clId="{581F6FC1-552D-4510-838D-118695E26488}" dt="2017-05-07T20:41:20.534" v="218" actId="2696"/>
+        <pc:sldMkLst>
+          <pc:docMk/>
+          <pc:sldMk cId="1369651259" sldId="1565"/>
+        </pc:sldMkLst>
+        <pc:spChg chg="mod">
+          <ac:chgData name="Paul Shealy" userId="ce785693-0585-4637-af68-c5060776d0ae" providerId="ADAL" clId="{581F6FC1-552D-4510-838D-118695E26488}" dt="2017-05-04T16:54:10.183" v="213" actId="14100"/>
+          <ac:spMkLst>
+            <pc:docMk/>
+            <pc:sldMk cId="1369651259" sldId="1565"/>
+            <ac:spMk id="2" creationId="{00000000-0000-0000-0000-000000000000}"/>
+          </ac:spMkLst>
+        </pc:spChg>
+        <pc:picChg chg="add mod">
+          <ac:chgData name="Paul Shealy" userId="ce785693-0585-4637-af68-c5060776d0ae" providerId="ADAL" clId="{581F6FC1-552D-4510-838D-118695E26488}" dt="2017-05-04T19:00:14.211" v="217" actId="1076"/>
+          <ac:picMkLst>
+            <pc:docMk/>
+            <pc:sldMk cId="1369651259" sldId="1565"/>
+            <ac:picMk id="1026" creationId="{7BB32B80-FE23-4690-9C4F-901DD0AC1F3F}"/>
+          </ac:picMkLst>
+        </pc:picChg>
+      </pc:sldChg>
+      <pc:sldChg chg="add del">
+        <pc:chgData name="Paul Shealy" userId="ce785693-0585-4637-af68-c5060776d0ae" providerId="ADAL" clId="{581F6FC1-552D-4510-838D-118695E26488}" dt="2017-05-07T20:42:42.279" v="256" actId="0"/>
+        <pc:sldMkLst>
+          <pc:docMk/>
+          <pc:sldMk cId="1566145622" sldId="1566"/>
+        </pc:sldMkLst>
+      </pc:sldChg>
+    </pc:docChg>
+  </pc:docChgLst>
+</pc:chgInfo>
 </file>
 
 <file path=ppt/handoutMasters/handoutMaster1.xml><?xml version="1.0" encoding="utf-8"?>
@@ -283,7 +602,7 @@
               <a:rPr lang="en-US" smtClean="0">
                 <a:latin typeface="Segoe UI" pitchFamily="34" charset="0"/>
               </a:rPr>
-              <a:t>5/7/2017 1:41 PM</a:t>
+              <a:t>5/9/2017 12:24 PM</a:t>
             </a:fld>
             <a:endParaRPr lang="en-US" dirty="0">
               <a:latin typeface="Segoe UI" pitchFamily="34" charset="0"/>
@@ -580,7 +899,7 @@
           <a:p>
             <a:fld id="{D18B56EA-E28F-4F92-9F16-7A6F2501B303}" type="datetime8">
               <a:rPr lang="en-US" smtClean="0"/>
-              <a:t>5/7/2017 1:40 PM</a:t>
+              <a:t>5/9/2017 12:24 PM</a:t>
             </a:fld>
             <a:endParaRPr lang="en-US" dirty="0"/>
           </a:p>
@@ -966,7 +1285,7 @@
           <a:p>
             <a:fld id="{88B44C4B-E218-4158-810E-47EF8FD635FD}" type="datetime8">
               <a:rPr lang="en-US" smtClean="0"/>
-              <a:t>5/7/2017 1:40 PM</a:t>
+              <a:t>5/9/2017 12:24 PM</a:t>
             </a:fld>
             <a:endParaRPr lang="en-US" dirty="0"/>
           </a:p>
@@ -1131,7 +1450,7 @@
           <a:p>
             <a:fld id="{90EC29EE-A8AD-4CE0-9C0B-116E0D4D7533}" type="datetime8">
               <a:rPr lang="en-US" smtClean="0"/>
-              <a:t>5/7/2017 1:40 PM</a:t>
+              <a:t>5/9/2017 12:24 PM</a:t>
             </a:fld>
             <a:endParaRPr lang="en-US" dirty="0"/>
           </a:p>
@@ -1316,7 +1635,7 @@
           <a:p>
             <a:fld id="{D18B56EA-E28F-4F92-9F16-7A6F2501B303}" type="datetime8">
               <a:rPr lang="en-US" smtClean="0"/>
-              <a:t>5/7/2017 1:40 PM</a:t>
+              <a:t>5/9/2017 12:24 PM</a:t>
             </a:fld>
             <a:endParaRPr lang="en-US" dirty="0"/>
           </a:p>
@@ -1500,7 +1819,7 @@
           <a:p>
             <a:fld id="{627F603A-779F-4101-9B83-C34650C566A7}" type="datetime8">
               <a:rPr lang="en-US" smtClean="0"/>
-              <a:t>5/8/2017 12:08 PM</a:t>
+              <a:t>5/9/2017 12:24 PM</a:t>
             </a:fld>
             <a:endParaRPr lang="en-US" dirty="0"/>
           </a:p>
@@ -1685,7 +2004,7 @@
           <a:p>
             <a:fld id="{D18B56EA-E28F-4F92-9F16-7A6F2501B303}" type="datetime8">
               <a:rPr lang="en-US" smtClean="0"/>
-              <a:t>5/7/2017 1:40 PM</a:t>
+              <a:t>5/9/2017 12:24 PM</a:t>
             </a:fld>
             <a:endParaRPr lang="en-US" dirty="0"/>
           </a:p>
@@ -1870,7 +2189,7 @@
           <a:p>
             <a:fld id="{D18B56EA-E28F-4F92-9F16-7A6F2501B303}" type="datetime8">
               <a:rPr lang="en-US" smtClean="0"/>
-              <a:t>5/7/2017 1:40 PM</a:t>
+              <a:t>5/9/2017 12:24 PM</a:t>
             </a:fld>
             <a:endParaRPr lang="en-US" dirty="0"/>
           </a:p>
@@ -1940,6 +2259,191 @@
             <p:ph type="sldImg"/>
           </p:nvPr>
         </p:nvSpPr>
+        <p:spPr/>
+      </p:sp>
+      <p:sp>
+        <p:nvSpPr>
+          <p:cNvPr id="3" name="Notes Placeholder 2"/>
+          <p:cNvSpPr>
+            <a:spLocks noGrp="1"/>
+          </p:cNvSpPr>
+          <p:nvPr>
+            <p:ph type="body" idx="1"/>
+          </p:nvPr>
+        </p:nvSpPr>
+        <p:spPr/>
+        <p:txBody>
+          <a:bodyPr/>
+          <a:lstStyle/>
+          <a:p>
+            <a:endParaRPr lang="en-US"/>
+          </a:p>
+        </p:txBody>
+      </p:sp>
+      <p:sp>
+        <p:nvSpPr>
+          <p:cNvPr id="4" name="Header Placeholder 3"/>
+          <p:cNvSpPr>
+            <a:spLocks noGrp="1"/>
+          </p:cNvSpPr>
+          <p:nvPr>
+            <p:ph type="hdr" sz="quarter" idx="10"/>
+          </p:nvPr>
+        </p:nvSpPr>
+        <p:spPr/>
+        <p:txBody>
+          <a:bodyPr/>
+          <a:lstStyle/>
+          <a:p>
+            <a:r>
+              <a:rPr lang="en-US"/>
+              <a:t>AI Immersion Workshop</a:t>
+            </a:r>
+            <a:endParaRPr lang="en-US" dirty="0"/>
+          </a:p>
+        </p:txBody>
+      </p:sp>
+      <p:sp>
+        <p:nvSpPr>
+          <p:cNvPr id="5" name="Footer Placeholder 4"/>
+          <p:cNvSpPr>
+            <a:spLocks noGrp="1"/>
+          </p:cNvSpPr>
+          <p:nvPr>
+            <p:ph type="ftr" sz="quarter" idx="11"/>
+          </p:nvPr>
+        </p:nvSpPr>
+        <p:spPr/>
+        <p:txBody>
+          <a:bodyPr/>
+          <a:lstStyle/>
+          <a:p>
+            <a:pPr defTabSz="914099" eaLnBrk="0" hangingPunct="0"/>
+            <a:r>
+              <a:rPr lang="en-US" sz="400">
+                <a:gradFill>
+                  <a:gsLst>
+                    <a:gs pos="0">
+                      <a:prstClr val="black"/>
+                    </a:gs>
+                    <a:gs pos="100000">
+                      <a:prstClr val="black"/>
+                    </a:gs>
+                  </a:gsLst>
+                  <a:lin ang="5400000" scaled="0"/>
+                </a:gradFill>
+                <a:latin typeface="Segoe UI" pitchFamily="34" charset="0"/>
+                <a:ea typeface="Segoe UI" pitchFamily="34" charset="0"/>
+                <a:cs typeface="Segoe UI" pitchFamily="34" charset="0"/>
+              </a:rPr>
+              <a:t>© Microsoft Corporation. All rights reserved. MICROSOFT MAKES NO WARRANTIES, EXPRESS, IMPLIED OR STATUTORY, AS TO THE INFORMATION IN THIS PRESENTATION.</a:t>
+            </a:r>
+            <a:endParaRPr lang="en-US" sz="400" dirty="0">
+              <a:gradFill>
+                <a:gsLst>
+                  <a:gs pos="0">
+                    <a:prstClr val="black"/>
+                  </a:gs>
+                  <a:gs pos="100000">
+                    <a:prstClr val="black"/>
+                  </a:gs>
+                </a:gsLst>
+                <a:lin ang="5400000" scaled="0"/>
+              </a:gradFill>
+              <a:latin typeface="Segoe UI" pitchFamily="34" charset="0"/>
+              <a:ea typeface="Segoe UI" pitchFamily="34" charset="0"/>
+              <a:cs typeface="Segoe UI" pitchFamily="34" charset="0"/>
+            </a:endParaRPr>
+          </a:p>
+        </p:txBody>
+      </p:sp>
+      <p:sp>
+        <p:nvSpPr>
+          <p:cNvPr id="6" name="Date Placeholder 5"/>
+          <p:cNvSpPr>
+            <a:spLocks noGrp="1"/>
+          </p:cNvSpPr>
+          <p:nvPr>
+            <p:ph type="dt" idx="12"/>
+          </p:nvPr>
+        </p:nvSpPr>
+        <p:spPr/>
+        <p:txBody>
+          <a:bodyPr/>
+          <a:lstStyle/>
+          <a:p>
+            <a:fld id="{D18B56EA-E28F-4F92-9F16-7A6F2501B303}" type="datetime8">
+              <a:rPr lang="en-US" smtClean="0"/>
+              <a:t>5/9/2017 12:36 PM</a:t>
+            </a:fld>
+            <a:endParaRPr lang="en-US" dirty="0"/>
+          </a:p>
+        </p:txBody>
+      </p:sp>
+      <p:sp>
+        <p:nvSpPr>
+          <p:cNvPr id="7" name="Slide Number Placeholder 6"/>
+          <p:cNvSpPr>
+            <a:spLocks noGrp="1"/>
+          </p:cNvSpPr>
+          <p:nvPr>
+            <p:ph type="sldNum" sz="quarter" idx="13"/>
+          </p:nvPr>
+        </p:nvSpPr>
+        <p:spPr/>
+        <p:txBody>
+          <a:bodyPr/>
+          <a:lstStyle/>
+          <a:p>
+            <a:fld id="{B4008EB6-D09E-4580-8CD6-DDB14511944F}" type="slidenum">
+              <a:rPr lang="en-US" smtClean="0"/>
+              <a:pPr/>
+              <a:t>15</a:t>
+            </a:fld>
+            <a:endParaRPr lang="en-US" dirty="0"/>
+          </a:p>
+        </p:txBody>
+      </p:sp>
+    </p:spTree>
+    <p:extLst>
+      <p:ext uri="{BB962C8B-B14F-4D97-AF65-F5344CB8AC3E}">
+        <p14:creationId xmlns:p14="http://schemas.microsoft.com/office/powerpoint/2010/main" val="3284093604"/>
+      </p:ext>
+    </p:extLst>
+  </p:cSld>
+  <p:clrMapOvr>
+    <a:masterClrMapping/>
+  </p:clrMapOvr>
+</p:notes>
+</file>
+
+<file path=ppt/notesSlides/notesSlide16.xml><?xml version="1.0" encoding="utf-8"?>
+<p:notes xmlns:a="http://schemas.openxmlformats.org/drawingml/2006/main" xmlns:r="http://schemas.openxmlformats.org/officeDocument/2006/relationships" xmlns:p="http://schemas.openxmlformats.org/presentationml/2006/main">
+  <p:cSld>
+    <p:spTree>
+      <p:nvGrpSpPr>
+        <p:cNvPr id="1" name=""/>
+        <p:cNvGrpSpPr/>
+        <p:nvPr/>
+      </p:nvGrpSpPr>
+      <p:grpSpPr>
+        <a:xfrm>
+          <a:off x="0" y="0"/>
+          <a:ext cx="0" cy="0"/>
+          <a:chOff x="0" y="0"/>
+          <a:chExt cx="0" cy="0"/>
+        </a:xfrm>
+      </p:grpSpPr>
+      <p:sp>
+        <p:nvSpPr>
+          <p:cNvPr id="2" name="Slide Image Placeholder 1"/>
+          <p:cNvSpPr>
+            <a:spLocks noGrp="1" noRot="1" noChangeAspect="1"/>
+          </p:cNvSpPr>
+          <p:nvPr>
+            <p:ph type="sldImg"/>
+          </p:nvPr>
+        </p:nvSpPr>
         <p:spPr>
           <a:xfrm>
             <a:off x="381000" y="685800"/>
@@ -2023,7 +2527,7 @@
                   <a:prstClr val="black"/>
                 </a:solidFill>
               </a:rPr>
-              <a:t>5/7/2017 1:40 PM</a:t>
+              <a:t>5/9/2017 12:24 PM</a:t>
             </a:fld>
             <a:endParaRPr lang="en-US" dirty="0">
               <a:solidFill>
@@ -2055,7 +2559,7 @@
                 </a:solidFill>
               </a:rPr>
               <a:pPr/>
-              <a:t>15</a:t>
+              <a:t>16</a:t>
             </a:fld>
             <a:endParaRPr lang="en-US" dirty="0">
               <a:solidFill>
@@ -2257,7 +2761,7 @@
           <a:p>
             <a:fld id="{8683C9CD-37C6-4B53-B210-CC8F66F90493}" type="datetime8">
               <a:rPr lang="en-US" smtClean="0"/>
-              <a:t>5/7/2017 1:40 PM</a:t>
+              <a:t>5/9/2017 12:24 PM</a:t>
             </a:fld>
             <a:endParaRPr lang="en-US" dirty="0"/>
           </a:p>
@@ -2620,7 +3124,7 @@
           <a:p>
             <a:fld id="{EA2B2ED8-C573-45EF-BF68-CEC19505703A}" type="datetime8">
               <a:rPr lang="en-US" smtClean="0"/>
-              <a:t>5/7/2017 1:40 PM</a:t>
+              <a:t>5/9/2017 12:24 PM</a:t>
             </a:fld>
             <a:endParaRPr lang="en-US" dirty="0"/>
           </a:p>
@@ -2873,7 +3377,7 @@
           <a:p>
             <a:fld id="{D18B56EA-E28F-4F92-9F16-7A6F2501B303}" type="datetime8">
               <a:rPr lang="en-US" smtClean="0"/>
-              <a:t>5/7/2017 1:40 PM</a:t>
+              <a:t>5/9/2017 12:24 PM</a:t>
             </a:fld>
             <a:endParaRPr lang="en-US" dirty="0"/>
           </a:p>
@@ -3058,7 +3562,7 @@
           <a:p>
             <a:fld id="{D18B56EA-E28F-4F92-9F16-7A6F2501B303}" type="datetime8">
               <a:rPr lang="en-US" smtClean="0"/>
-              <a:t>5/7/2017 1:40 PM</a:t>
+              <a:t>5/9/2017 12:24 PM</a:t>
             </a:fld>
             <a:endParaRPr lang="en-US" dirty="0"/>
           </a:p>
@@ -3243,7 +3747,7 @@
           <a:p>
             <a:fld id="{D18B56EA-E28F-4F92-9F16-7A6F2501B303}" type="datetime8">
               <a:rPr lang="en-US" smtClean="0"/>
-              <a:t>5/7/2017 1:40 PM</a:t>
+              <a:t>5/9/2017 12:24 PM</a:t>
             </a:fld>
             <a:endParaRPr lang="en-US" dirty="0"/>
           </a:p>
@@ -3428,7 +3932,7 @@
           <a:p>
             <a:fld id="{D18B56EA-E28F-4F92-9F16-7A6F2501B303}" type="datetime8">
               <a:rPr lang="en-US" smtClean="0"/>
-              <a:t>5/7/2017 1:40 PM</a:t>
+              <a:t>5/9/2017 12:24 PM</a:t>
             </a:fld>
             <a:endParaRPr lang="en-US" dirty="0"/>
           </a:p>
@@ -3613,7 +4117,7 @@
           <a:p>
             <a:fld id="{D18B56EA-E28F-4F92-9F16-7A6F2501B303}" type="datetime8">
               <a:rPr lang="en-US" smtClean="0"/>
-              <a:t>5/7/2017 1:40 PM</a:t>
+              <a:t>5/9/2017 12:24 PM</a:t>
             </a:fld>
             <a:endParaRPr lang="en-US" dirty="0"/>
           </a:p>
@@ -3798,7 +4302,7 @@
           <a:p>
             <a:fld id="{D18B56EA-E28F-4F92-9F16-7A6F2501B303}" type="datetime8">
               <a:rPr lang="en-US" smtClean="0"/>
-              <a:t>5/7/2017 1:40 PM</a:t>
+              <a:t>5/9/2017 12:24 PM</a:t>
             </a:fld>
             <a:endParaRPr lang="en-US" dirty="0"/>
           </a:p>
@@ -12193,6 +12697,441 @@
 </file>
 
 <file path=ppt/slides/slide15.xml><?xml version="1.0" encoding="utf-8"?>
+<p:sld xmlns:a="http://schemas.openxmlformats.org/drawingml/2006/main" xmlns:r="http://schemas.openxmlformats.org/officeDocument/2006/relationships" xmlns:p="http://schemas.openxmlformats.org/presentationml/2006/main">
+  <p:cSld>
+    <p:spTree>
+      <p:nvGrpSpPr>
+        <p:cNvPr id="1" name=""/>
+        <p:cNvGrpSpPr/>
+        <p:nvPr/>
+      </p:nvGrpSpPr>
+      <p:grpSpPr>
+        <a:xfrm>
+          <a:off x="0" y="0"/>
+          <a:ext cx="0" cy="0"/>
+          <a:chOff x="0" y="0"/>
+          <a:chExt cx="0" cy="0"/>
+        </a:xfrm>
+      </p:grpSpPr>
+      <p:sp>
+        <p:nvSpPr>
+          <p:cNvPr id="2" name="Title 1"/>
+          <p:cNvSpPr>
+            <a:spLocks noGrp="1"/>
+          </p:cNvSpPr>
+          <p:nvPr>
+            <p:ph type="title"/>
+          </p:nvPr>
+        </p:nvSpPr>
+        <p:spPr/>
+        <p:txBody>
+          <a:bodyPr/>
+          <a:lstStyle/>
+          <a:p>
+            <a:r>
+              <a:rPr lang="en-US" dirty="0"/>
+              <a:t>References</a:t>
+            </a:r>
+          </a:p>
+        </p:txBody>
+      </p:sp>
+      <p:sp>
+        <p:nvSpPr>
+          <p:cNvPr id="3" name="Text Placeholder 2"/>
+          <p:cNvSpPr>
+            <a:spLocks noGrp="1"/>
+          </p:cNvSpPr>
+          <p:nvPr>
+            <p:ph type="body" sz="quarter" idx="10"/>
+          </p:nvPr>
+        </p:nvSpPr>
+        <p:spPr>
+          <a:xfrm>
+            <a:off x="274702" y="1211287"/>
+            <a:ext cx="11888787" cy="6133987"/>
+          </a:xfrm>
+        </p:spPr>
+        <p:txBody>
+          <a:bodyPr/>
+          <a:lstStyle/>
+          <a:p>
+            <a:pPr marL="0" lvl="0" indent="0" defTabSz="914400">
+              <a:spcBef>
+                <a:spcPts val="0"/>
+              </a:spcBef>
+              <a:spcAft>
+                <a:spcPts val="600"/>
+              </a:spcAft>
+              <a:buSzTx/>
+              <a:buNone/>
+            </a:pPr>
+            <a:endParaRPr lang="en-US" sz="2800" dirty="0">
+              <a:solidFill>
+                <a:srgbClr val="505050">
+                  <a:lumMod val="75000"/>
+                </a:srgbClr>
+              </a:solidFill>
+              <a:latin typeface="Segoe UI"/>
+            </a:endParaRPr>
+          </a:p>
+          <a:p>
+            <a:pPr marL="457200" lvl="0" indent="-457200" defTabSz="914400">
+              <a:spcBef>
+                <a:spcPts val="0"/>
+              </a:spcBef>
+              <a:spcAft>
+                <a:spcPts val="600"/>
+              </a:spcAft>
+              <a:buSzTx/>
+              <a:buFont typeface="Arial" panose="020B0604020202020204" pitchFamily="34" charset="0"/>
+              <a:buChar char="•"/>
+            </a:pPr>
+            <a:r>
+              <a:rPr lang="en-US" dirty="0">
+                <a:latin typeface="Segoe UI Semilight" panose="020B0402040204020203" pitchFamily="34" charset="0"/>
+                <a:cs typeface="Segoe UI Semilight" panose="020B0402040204020203" pitchFamily="34" charset="0"/>
+              </a:rPr>
+              <a:t>DSVM Product Page</a:t>
+            </a:r>
+          </a:p>
+          <a:p>
+            <a:pPr marL="1143000" lvl="3" indent="-457200" defTabSz="914400">
+              <a:spcBef>
+                <a:spcPts val="0"/>
+              </a:spcBef>
+              <a:spcAft>
+                <a:spcPts val="600"/>
+              </a:spcAft>
+              <a:buSzTx/>
+              <a:buFont typeface="Arial" panose="020B0604020202020204" pitchFamily="34" charset="0"/>
+              <a:buChar char="•"/>
+            </a:pPr>
+            <a:r>
+              <a:rPr lang="en-US" sz="2800" dirty="0">
+                <a:solidFill>
+                  <a:srgbClr val="505050">
+                    <a:lumMod val="75000"/>
+                  </a:srgbClr>
+                </a:solidFill>
+                <a:latin typeface="Segoe UI"/>
+                <a:hlinkClick r:id="rId3"/>
+              </a:rPr>
+              <a:t>http://aka.ms/dsvm</a:t>
+            </a:r>
+            <a:r>
+              <a:rPr lang="en-US" sz="2800" dirty="0">
+                <a:solidFill>
+                  <a:srgbClr val="505050">
+                    <a:lumMod val="75000"/>
+                  </a:srgbClr>
+                </a:solidFill>
+                <a:latin typeface="Segoe UI"/>
+              </a:rPr>
+              <a:t> (Windows)</a:t>
+            </a:r>
+          </a:p>
+          <a:p>
+            <a:pPr marL="1143000" lvl="3" indent="-457200" defTabSz="914400">
+              <a:spcBef>
+                <a:spcPts val="0"/>
+              </a:spcBef>
+              <a:spcAft>
+                <a:spcPts val="600"/>
+              </a:spcAft>
+              <a:buSzTx/>
+              <a:buFont typeface="Arial" panose="020B0604020202020204" pitchFamily="34" charset="0"/>
+              <a:buChar char="•"/>
+            </a:pPr>
+            <a:r>
+              <a:rPr lang="en-US" sz="2800" dirty="0">
+                <a:solidFill>
+                  <a:srgbClr val="505050">
+                    <a:lumMod val="75000"/>
+                  </a:srgbClr>
+                </a:solidFill>
+                <a:latin typeface="Segoe UI"/>
+                <a:hlinkClick r:id="rId4"/>
+              </a:rPr>
+              <a:t>http://aka.ms/dsvm/deeplearning</a:t>
+            </a:r>
+            <a:r>
+              <a:rPr lang="en-US" sz="2800" dirty="0">
+                <a:solidFill>
+                  <a:srgbClr val="505050">
+                    <a:lumMod val="75000"/>
+                  </a:srgbClr>
+                </a:solidFill>
+                <a:latin typeface="Segoe UI"/>
+              </a:rPr>
+              <a:t>  (Windows w/Deep Learning)</a:t>
+            </a:r>
+          </a:p>
+          <a:p>
+            <a:pPr marL="1143000" lvl="3" indent="-457200" defTabSz="914400">
+              <a:spcBef>
+                <a:spcPts val="0"/>
+              </a:spcBef>
+              <a:spcAft>
+                <a:spcPts val="600"/>
+              </a:spcAft>
+              <a:buSzTx/>
+              <a:buFont typeface="Arial" panose="020B0604020202020204" pitchFamily="34" charset="0"/>
+              <a:buChar char="•"/>
+            </a:pPr>
+            <a:r>
+              <a:rPr lang="en-US" sz="2800" dirty="0">
+                <a:solidFill>
+                  <a:srgbClr val="505050">
+                    <a:lumMod val="75000"/>
+                  </a:srgbClr>
+                </a:solidFill>
+                <a:latin typeface="Segoe UI"/>
+                <a:hlinkClick r:id="rId5"/>
+              </a:rPr>
+              <a:t>http://aka.ms/dsvm/ubuntu</a:t>
+            </a:r>
+            <a:r>
+              <a:rPr lang="en-US" sz="2800" dirty="0">
+                <a:solidFill>
+                  <a:srgbClr val="505050">
+                    <a:lumMod val="75000"/>
+                  </a:srgbClr>
+                </a:solidFill>
+                <a:latin typeface="Segoe UI"/>
+              </a:rPr>
+              <a:t>  (Ubuntu)</a:t>
+            </a:r>
+          </a:p>
+          <a:p>
+            <a:pPr marL="685800" lvl="3" indent="0" defTabSz="914400">
+              <a:spcBef>
+                <a:spcPts val="0"/>
+              </a:spcBef>
+              <a:spcAft>
+                <a:spcPts val="600"/>
+              </a:spcAft>
+              <a:buSzTx/>
+              <a:buNone/>
+            </a:pPr>
+            <a:endParaRPr lang="en-US" sz="1400" dirty="0">
+              <a:solidFill>
+                <a:srgbClr val="505050">
+                  <a:lumMod val="75000"/>
+                </a:srgbClr>
+              </a:solidFill>
+              <a:latin typeface="Segoe UI"/>
+            </a:endParaRPr>
+          </a:p>
+          <a:p>
+            <a:pPr marL="461963" lvl="1" indent="-457200" defTabSz="914400">
+              <a:spcBef>
+                <a:spcPts val="0"/>
+              </a:spcBef>
+              <a:spcAft>
+                <a:spcPts val="600"/>
+              </a:spcAft>
+              <a:buSzTx/>
+              <a:buFont typeface="Arial" panose="020B0604020202020204" pitchFamily="34" charset="0"/>
+              <a:buChar char="•"/>
+            </a:pPr>
+            <a:r>
+              <a:rPr lang="en-US" dirty="0"/>
+              <a:t>2 Page Handout </a:t>
+            </a:r>
+            <a:r>
+              <a:rPr lang="en-US" dirty="0">
+                <a:solidFill>
+                  <a:srgbClr val="505050">
+                    <a:lumMod val="75000"/>
+                  </a:srgbClr>
+                </a:solidFill>
+                <a:latin typeface="Segoe UI"/>
+              </a:rPr>
+              <a:t>– </a:t>
+            </a:r>
+            <a:r>
+              <a:rPr lang="en-US" dirty="0">
+                <a:solidFill>
+                  <a:srgbClr val="505050">
+                    <a:lumMod val="75000"/>
+                  </a:srgbClr>
+                </a:solidFill>
+                <a:latin typeface="Segoe UI"/>
+                <a:hlinkClick r:id="rId6"/>
+              </a:rPr>
+              <a:t>http://aka.ms/dsvm/handout</a:t>
+            </a:r>
+            <a:r>
+              <a:rPr lang="en-US" dirty="0">
+                <a:solidFill>
+                  <a:srgbClr val="505050">
+                    <a:lumMod val="75000"/>
+                  </a:srgbClr>
+                </a:solidFill>
+                <a:latin typeface="Segoe UI"/>
+              </a:rPr>
+              <a:t> </a:t>
+            </a:r>
+          </a:p>
+          <a:p>
+            <a:pPr marL="4763" lvl="1" indent="0" defTabSz="914400">
+              <a:spcBef>
+                <a:spcPts val="0"/>
+              </a:spcBef>
+              <a:spcAft>
+                <a:spcPts val="600"/>
+              </a:spcAft>
+              <a:buSzTx/>
+              <a:buNone/>
+            </a:pPr>
+            <a:endParaRPr lang="en-US" dirty="0">
+              <a:solidFill>
+                <a:srgbClr val="505050">
+                  <a:lumMod val="75000"/>
+                </a:srgbClr>
+              </a:solidFill>
+              <a:latin typeface="Segoe UI"/>
+            </a:endParaRPr>
+          </a:p>
+          <a:p>
+            <a:pPr marL="461963" lvl="1" indent="-457200" defTabSz="914400">
+              <a:spcBef>
+                <a:spcPts val="0"/>
+              </a:spcBef>
+              <a:spcAft>
+                <a:spcPts val="600"/>
+              </a:spcAft>
+              <a:buSzTx/>
+              <a:buFont typeface="Arial" panose="020B0604020202020204" pitchFamily="34" charset="0"/>
+              <a:buChar char="•"/>
+            </a:pPr>
+            <a:r>
+              <a:rPr lang="en-US" dirty="0">
+                <a:solidFill>
+                  <a:srgbClr val="505050">
+                    <a:lumMod val="75000"/>
+                  </a:srgbClr>
+                </a:solidFill>
+                <a:latin typeface="Segoe UI Semilight" panose="020B0402040204020203" pitchFamily="34" charset="0"/>
+                <a:cs typeface="Segoe UI Semilight" panose="020B0402040204020203" pitchFamily="34" charset="0"/>
+              </a:rPr>
+              <a:t>DSVM Forum - send questions, feedback and feature requests on the forum </a:t>
+            </a:r>
+            <a:r>
+              <a:rPr lang="en-US" dirty="0">
+                <a:solidFill>
+                  <a:srgbClr val="505050">
+                    <a:lumMod val="75000"/>
+                  </a:srgbClr>
+                </a:solidFill>
+                <a:latin typeface="Segoe UI"/>
+              </a:rPr>
+              <a:t>- </a:t>
+            </a:r>
+            <a:r>
+              <a:rPr lang="en-US" dirty="0">
+                <a:solidFill>
+                  <a:srgbClr val="505050">
+                    <a:lumMod val="75000"/>
+                  </a:srgbClr>
+                </a:solidFill>
+                <a:latin typeface="Segoe UI"/>
+                <a:hlinkClick r:id="rId7"/>
+              </a:rPr>
+              <a:t>http://aka.ms/dsvm/forum</a:t>
+            </a:r>
+            <a:br>
+              <a:rPr lang="en-US" dirty="0">
+                <a:solidFill>
+                  <a:srgbClr val="505050">
+                    <a:lumMod val="75000"/>
+                  </a:srgbClr>
+                </a:solidFill>
+                <a:latin typeface="Segoe UI"/>
+              </a:rPr>
+            </a:br>
+            <a:endParaRPr lang="en-US" dirty="0">
+              <a:solidFill>
+                <a:srgbClr val="505050">
+                  <a:lumMod val="75000"/>
+                </a:srgbClr>
+              </a:solidFill>
+              <a:latin typeface="Segoe UI"/>
+            </a:endParaRPr>
+          </a:p>
+          <a:p>
+            <a:pPr marL="461963" lvl="1" indent="-457200" defTabSz="914400">
+              <a:spcBef>
+                <a:spcPts val="0"/>
+              </a:spcBef>
+              <a:spcAft>
+                <a:spcPts val="600"/>
+              </a:spcAft>
+              <a:buSzTx/>
+              <a:buFont typeface="Arial" panose="020B0604020202020204" pitchFamily="34" charset="0"/>
+              <a:buChar char="•"/>
+            </a:pPr>
+            <a:r>
+              <a:rPr lang="en-US" dirty="0"/>
+              <a:t>Learn Analytics @ Microsoft</a:t>
+            </a:r>
+            <a:r>
+              <a:rPr lang="en-US" dirty="0">
+                <a:solidFill>
+                  <a:srgbClr val="505050">
+                    <a:lumMod val="75000"/>
+                  </a:srgbClr>
+                </a:solidFill>
+                <a:latin typeface="Segoe UI"/>
+              </a:rPr>
+              <a:t> – </a:t>
+            </a:r>
+            <a:r>
+              <a:rPr lang="en-US" dirty="0">
+                <a:solidFill>
+                  <a:srgbClr val="505050">
+                    <a:lumMod val="75000"/>
+                  </a:srgbClr>
+                </a:solidFill>
+                <a:latin typeface="Segoe UI"/>
+                <a:hlinkClick r:id="rId8"/>
+              </a:rPr>
+              <a:t>http://learnanalytics.microsoft.com</a:t>
+            </a:r>
+            <a:r>
+              <a:rPr lang="en-US" dirty="0">
+                <a:solidFill>
+                  <a:srgbClr val="505050">
+                    <a:lumMod val="75000"/>
+                  </a:srgbClr>
+                </a:solidFill>
+                <a:latin typeface="Segoe UI"/>
+              </a:rPr>
+              <a:t> </a:t>
+            </a:r>
+          </a:p>
+          <a:p>
+            <a:endParaRPr lang="en-US" dirty="0"/>
+          </a:p>
+        </p:txBody>
+      </p:sp>
+    </p:spTree>
+    <p:extLst>
+      <p:ext uri="{BB962C8B-B14F-4D97-AF65-F5344CB8AC3E}">
+        <p14:creationId xmlns:p14="http://schemas.microsoft.com/office/powerpoint/2010/main" val="3659253015"/>
+      </p:ext>
+    </p:extLst>
+  </p:cSld>
+  <p:clrMapOvr>
+    <a:masterClrMapping/>
+  </p:clrMapOvr>
+  <p:transition>
+    <p:fade/>
+  </p:transition>
+</p:sld>
+</file>
+
+<file path=ppt/slides/slide16.xml><?xml version="1.0" encoding="utf-8"?>
 <p:sld xmlns:a="http://schemas.openxmlformats.org/drawingml/2006/main" xmlns:r="http://schemas.openxmlformats.org/officeDocument/2006/relationships" xmlns:p="http://schemas.openxmlformats.org/presentationml/2006/main">
   <p:cSld>
     <p:spTree>
@@ -14183,6 +15122,12 @@
 </file>
 
 <file path=customXml/item1.xml><?xml version="1.0" encoding="utf-8"?>
+<p:properties xmlns:p="http://schemas.microsoft.com/office/2006/metadata/properties" xmlns:xsi="http://www.w3.org/2001/XMLSchema-instance" xmlns:pc="http://schemas.microsoft.com/office/infopath/2007/PartnerControls">
+  <documentManagement/>
+</p:properties>
+</file>
+
+<file path=customXml/item2.xml><?xml version="1.0" encoding="utf-8"?>
 <ct:contentTypeSchema xmlns:ct="http://schemas.microsoft.com/office/2006/metadata/contentType" xmlns:ma="http://schemas.microsoft.com/office/2006/metadata/properties/metaAttributes" ct:_="" ma:_="" ma:contentTypeName="Document" ma:contentTypeID="0x010100D38D393254D930438EAEFA57144E97A1" ma:contentTypeVersion="0" ma:contentTypeDescription="Create a new document." ma:contentTypeScope="" ma:versionID="82c3ea0a41e419028295de45840ac119">
   <xsd:schema xmlns:xsd="http://www.w3.org/2001/XMLSchema" xmlns:xs="http://www.w3.org/2001/XMLSchema" xmlns:p="http://schemas.microsoft.com/office/2006/metadata/properties" targetNamespace="http://schemas.microsoft.com/office/2006/metadata/properties" ma:root="true" ma:fieldsID="c2e60de00df205aa164b5c7d26abd197">
     <xsd:element name="properties">
@@ -14296,12 +15241,6 @@
 </ct:contentTypeSchema>
 </file>
 
-<file path=customXml/item2.xml><?xml version="1.0" encoding="utf-8"?>
-<p:properties xmlns:p="http://schemas.microsoft.com/office/2006/metadata/properties" xmlns:xsi="http://www.w3.org/2001/XMLSchema-instance" xmlns:pc="http://schemas.microsoft.com/office/infopath/2007/PartnerControls">
-  <documentManagement/>
-</p:properties>
-</file>
-
 <file path=customXml/item3.xml><?xml version="1.0" encoding="utf-8"?>
 <?mso-contentType ?>
 <FormTemplates xmlns="http://schemas.microsoft.com/sharepoint/v3/contenttype/forms">
@@ -14312,6 +15251,21 @@
 </file>
 
 <file path=customXml/itemProps1.xml><?xml version="1.0" encoding="utf-8"?>
+<ds:datastoreItem xmlns:ds="http://schemas.openxmlformats.org/officeDocument/2006/customXml" ds:itemID="{F990F116-B58F-4255-B05B-DA3808E0E5C6}">
+  <ds:schemaRefs>
+    <ds:schemaRef ds:uri="http://purl.org/dc/terms/"/>
+    <ds:schemaRef ds:uri="http://schemas.openxmlformats.org/package/2006/metadata/core-properties"/>
+    <ds:schemaRef ds:uri="http://purl.org/dc/dcmitype/"/>
+    <ds:schemaRef ds:uri="http://schemas.microsoft.com/office/infopath/2007/PartnerControls"/>
+    <ds:schemaRef ds:uri="http://schemas.microsoft.com/office/2006/documentManagement/types"/>
+    <ds:schemaRef ds:uri="http://purl.org/dc/elements/1.1/"/>
+    <ds:schemaRef ds:uri="http://schemas.microsoft.com/office/2006/metadata/properties"/>
+    <ds:schemaRef ds:uri="http://www.w3.org/XML/1998/namespace"/>
+  </ds:schemaRefs>
+</ds:datastoreItem>
+</file>
+
+<file path=customXml/itemProps2.xml><?xml version="1.0" encoding="utf-8"?>
 <ds:datastoreItem xmlns:ds="http://schemas.openxmlformats.org/officeDocument/2006/customXml" ds:itemID="{C8414C32-2505-40FC-BFD5-11C2BE67FE3C}">
   <ds:schemaRefs>
     <ds:schemaRef ds:uri="http://schemas.microsoft.com/office/2006/metadata/contentType"/>
@@ -14327,21 +15281,6 @@
 </ds:datastoreItem>
 </file>
 
-<file path=customXml/itemProps2.xml><?xml version="1.0" encoding="utf-8"?>
-<ds:datastoreItem xmlns:ds="http://schemas.openxmlformats.org/officeDocument/2006/customXml" ds:itemID="{F990F116-B58F-4255-B05B-DA3808E0E5C6}">
-  <ds:schemaRefs>
-    <ds:schemaRef ds:uri="http://purl.org/dc/terms/"/>
-    <ds:schemaRef ds:uri="http://schemas.openxmlformats.org/package/2006/metadata/core-properties"/>
-    <ds:schemaRef ds:uri="http://purl.org/dc/dcmitype/"/>
-    <ds:schemaRef ds:uri="http://schemas.microsoft.com/office/infopath/2007/PartnerControls"/>
-    <ds:schemaRef ds:uri="http://schemas.microsoft.com/office/2006/documentManagement/types"/>
-    <ds:schemaRef ds:uri="http://purl.org/dc/elements/1.1/"/>
-    <ds:schemaRef ds:uri="http://schemas.microsoft.com/office/2006/metadata/properties"/>
-    <ds:schemaRef ds:uri="http://www.w3.org/XML/1998/namespace"/>
-  </ds:schemaRefs>
-</ds:datastoreItem>
-</file>
-
 <file path=customXml/itemProps3.xml><?xml version="1.0" encoding="utf-8"?>
 <ds:datastoreItem xmlns:ds="http://schemas.openxmlformats.org/officeDocument/2006/customXml" ds:itemID="{758FDAC0-319D-4A54-8D8E-1D42CB1F8004}">
   <ds:schemaRefs>

</xml_diff>